<commit_message>
added bicep and terraform AKS cluster setups
</commit_message>
<xml_diff>
--- a/AKS.pptx
+++ b/AKS.pptx
@@ -121,15 +121,38 @@
 </p:presentation>
 </file>
 
+<file path=ppt/revisionInfo.xml><?xml version="1.0" encoding="utf-8"?>
+<p1510:revInfo xmlns:a="http://schemas.openxmlformats.org/drawingml/2006/main" xmlns:r="http://schemas.openxmlformats.org/officeDocument/2006/relationships" xmlns:p1510="http://schemas.microsoft.com/office/powerpoint/2015/10/main">
+  <p1510:revLst>
+    <p1510:client id="{8E6867AD-4FFC-4E7B-966C-CB2130BD4B85}" v="4" dt="2026-01-07T06:46:24.835"/>
+  </p1510:revLst>
+</p1510:revInfo>
+</file>
+
 <file path=ppt/changesInfos/changesInfo1.xml><?xml version="1.0" encoding="utf-8"?>
 <pc:chgInfo xmlns:a="http://schemas.openxmlformats.org/drawingml/2006/main" xmlns:r="http://schemas.openxmlformats.org/officeDocument/2006/relationships" xmlns:ac="http://schemas.microsoft.com/office/drawing/2013/main/command" xmlns:pc="http://schemas.microsoft.com/office/powerpoint/2013/main/command">
   <pc:docChgLst>
     <pc:chgData name="faik bilgen" userId="9fcb1696e65a161f" providerId="LiveId" clId="{0C3A4C9E-717D-4ADE-97E0-B0AD580B3355}"/>
     <pc:docChg chg="undo custSel addSld modSld">
-      <pc:chgData name="faik bilgen" userId="9fcb1696e65a161f" providerId="LiveId" clId="{0C3A4C9E-717D-4ADE-97E0-B0AD580B3355}" dt="2026-01-07T06:25:41.831" v="157" actId="20577"/>
+      <pc:chgData name="faik bilgen" userId="9fcb1696e65a161f" providerId="LiveId" clId="{0C3A4C9E-717D-4ADE-97E0-B0AD580B3355}" dt="2026-01-07T06:46:24.835" v="174"/>
       <pc:docMkLst>
         <pc:docMk/>
       </pc:docMkLst>
+      <pc:sldChg chg="modSp mod">
+        <pc:chgData name="faik bilgen" userId="9fcb1696e65a161f" providerId="LiveId" clId="{0C3A4C9E-717D-4ADE-97E0-B0AD580B3355}" dt="2026-01-07T06:39:27.270" v="166" actId="20577"/>
+        <pc:sldMkLst>
+          <pc:docMk/>
+          <pc:sldMk cId="1785283873" sldId="256"/>
+        </pc:sldMkLst>
+        <pc:spChg chg="mod">
+          <ac:chgData name="faik bilgen" userId="9fcb1696e65a161f" providerId="LiveId" clId="{0C3A4C9E-717D-4ADE-97E0-B0AD580B3355}" dt="2026-01-07T06:39:27.270" v="166" actId="20577"/>
+          <ac:spMkLst>
+            <pc:docMk/>
+            <pc:sldMk cId="1785283873" sldId="256"/>
+            <ac:spMk id="2" creationId="{E8C392AE-673E-92C5-303F-25E8450BD96A}"/>
+          </ac:spMkLst>
+        </pc:spChg>
+      </pc:sldChg>
       <pc:sldChg chg="addSp modSp mod setBg addAnim">
         <pc:chgData name="faik bilgen" userId="9fcb1696e65a161f" providerId="LiveId" clId="{0C3A4C9E-717D-4ADE-97E0-B0AD580B3355}" dt="2026-01-06T16:11:31.035" v="7"/>
         <pc:sldMkLst>
@@ -329,7 +352,7 @@
         </pc:spChg>
       </pc:sldChg>
       <pc:sldChg chg="addSp delSp modSp new mod">
-        <pc:chgData name="faik bilgen" userId="9fcb1696e65a161f" providerId="LiveId" clId="{0C3A4C9E-717D-4ADE-97E0-B0AD580B3355}" dt="2026-01-07T06:25:41.831" v="157" actId="20577"/>
+        <pc:chgData name="faik bilgen" userId="9fcb1696e65a161f" providerId="LiveId" clId="{0C3A4C9E-717D-4ADE-97E0-B0AD580B3355}" dt="2026-01-07T06:46:24.835" v="174"/>
         <pc:sldMkLst>
           <pc:docMk/>
           <pc:sldMk cId="1874607520" sldId="266"/>
@@ -351,7 +374,7 @@
           </ac:spMkLst>
         </pc:spChg>
         <pc:graphicFrameChg chg="add mod modGraphic">
-          <ac:chgData name="faik bilgen" userId="9fcb1696e65a161f" providerId="LiveId" clId="{0C3A4C9E-717D-4ADE-97E0-B0AD580B3355}" dt="2026-01-07T06:25:41.831" v="157" actId="20577"/>
+          <ac:chgData name="faik bilgen" userId="9fcb1696e65a161f" providerId="LiveId" clId="{0C3A4C9E-717D-4ADE-97E0-B0AD580B3355}" dt="2026-01-07T06:46:24.835" v="174"/>
           <ac:graphicFrameMkLst>
             <pc:docMk/>
             <pc:sldMk cId="1874607520" sldId="266"/>
@@ -511,7 +534,7 @@
           <a:p>
             <a:fld id="{B9268321-C9E7-441E-8ECB-F5B48CA38B30}" type="datetimeFigureOut">
               <a:rPr lang="en-US" smtClean="0"/>
-              <a:t>1/6/2026</a:t>
+              <a:t>1/7/2026</a:t>
             </a:fld>
             <a:endParaRPr lang="en-US"/>
           </a:p>
@@ -709,7 +732,7 @@
           <a:p>
             <a:fld id="{B9268321-C9E7-441E-8ECB-F5B48CA38B30}" type="datetimeFigureOut">
               <a:rPr lang="en-US" smtClean="0"/>
-              <a:t>1/6/2026</a:t>
+              <a:t>1/7/2026</a:t>
             </a:fld>
             <a:endParaRPr lang="en-US"/>
           </a:p>
@@ -917,7 +940,7 @@
           <a:p>
             <a:fld id="{B9268321-C9E7-441E-8ECB-F5B48CA38B30}" type="datetimeFigureOut">
               <a:rPr lang="en-US" smtClean="0"/>
-              <a:t>1/6/2026</a:t>
+              <a:t>1/7/2026</a:t>
             </a:fld>
             <a:endParaRPr lang="en-US"/>
           </a:p>
@@ -1115,7 +1138,7 @@
           <a:p>
             <a:fld id="{B9268321-C9E7-441E-8ECB-F5B48CA38B30}" type="datetimeFigureOut">
               <a:rPr lang="en-US" smtClean="0"/>
-              <a:t>1/6/2026</a:t>
+              <a:t>1/7/2026</a:t>
             </a:fld>
             <a:endParaRPr lang="en-US"/>
           </a:p>
@@ -1390,7 +1413,7 @@
           <a:p>
             <a:fld id="{B9268321-C9E7-441E-8ECB-F5B48CA38B30}" type="datetimeFigureOut">
               <a:rPr lang="en-US" smtClean="0"/>
-              <a:t>1/6/2026</a:t>
+              <a:t>1/7/2026</a:t>
             </a:fld>
             <a:endParaRPr lang="en-US"/>
           </a:p>
@@ -1655,7 +1678,7 @@
           <a:p>
             <a:fld id="{B9268321-C9E7-441E-8ECB-F5B48CA38B30}" type="datetimeFigureOut">
               <a:rPr lang="en-US" smtClean="0"/>
-              <a:t>1/6/2026</a:t>
+              <a:t>1/7/2026</a:t>
             </a:fld>
             <a:endParaRPr lang="en-US"/>
           </a:p>
@@ -2067,7 +2090,7 @@
           <a:p>
             <a:fld id="{B9268321-C9E7-441E-8ECB-F5B48CA38B30}" type="datetimeFigureOut">
               <a:rPr lang="en-US" smtClean="0"/>
-              <a:t>1/6/2026</a:t>
+              <a:t>1/7/2026</a:t>
             </a:fld>
             <a:endParaRPr lang="en-US"/>
           </a:p>
@@ -2208,7 +2231,7 @@
           <a:p>
             <a:fld id="{B9268321-C9E7-441E-8ECB-F5B48CA38B30}" type="datetimeFigureOut">
               <a:rPr lang="en-US" smtClean="0"/>
-              <a:t>1/6/2026</a:t>
+              <a:t>1/7/2026</a:t>
             </a:fld>
             <a:endParaRPr lang="en-US"/>
           </a:p>
@@ -2321,7 +2344,7 @@
           <a:p>
             <a:fld id="{B9268321-C9E7-441E-8ECB-F5B48CA38B30}" type="datetimeFigureOut">
               <a:rPr lang="en-US" smtClean="0"/>
-              <a:t>1/6/2026</a:t>
+              <a:t>1/7/2026</a:t>
             </a:fld>
             <a:endParaRPr lang="en-US"/>
           </a:p>
@@ -2632,7 +2655,7 @@
           <a:p>
             <a:fld id="{B9268321-C9E7-441E-8ECB-F5B48CA38B30}" type="datetimeFigureOut">
               <a:rPr lang="en-US" smtClean="0"/>
-              <a:t>1/6/2026</a:t>
+              <a:t>1/7/2026</a:t>
             </a:fld>
             <a:endParaRPr lang="en-US"/>
           </a:p>
@@ -2920,7 +2943,7 @@
           <a:p>
             <a:fld id="{B9268321-C9E7-441E-8ECB-F5B48CA38B30}" type="datetimeFigureOut">
               <a:rPr lang="en-US" smtClean="0"/>
-              <a:t>1/6/2026</a:t>
+              <a:t>1/7/2026</a:t>
             </a:fld>
             <a:endParaRPr lang="en-US"/>
           </a:p>
@@ -3161,7 +3184,7 @@
           <a:p>
             <a:fld id="{B9268321-C9E7-441E-8ECB-F5B48CA38B30}" type="datetimeFigureOut">
               <a:rPr lang="en-US" smtClean="0"/>
-              <a:t>1/6/2026</a:t>
+              <a:t>1/7/2026</a:t>
             </a:fld>
             <a:endParaRPr lang="en-US"/>
           </a:p>
@@ -3601,7 +3624,7 @@
           <a:p>
             <a:r>
               <a:rPr lang="en-US" dirty="0"/>
-              <a:t>AKS</a:t>
+              <a:t>AKS Workshop</a:t>
             </a:r>
           </a:p>
         </p:txBody>
@@ -3713,14 +3736,14 @@
           <p:nvPr>
             <p:extLst>
               <p:ext uri="{D42A27DB-BD31-4B8C-83A1-F6EECF244321}">
-                <p14:modId xmlns:p14="http://schemas.microsoft.com/office/powerpoint/2010/main" val="678052675"/>
+                <p14:modId xmlns:p14="http://schemas.microsoft.com/office/powerpoint/2010/main" val="3780420787"/>
               </p:ext>
             </p:extLst>
           </p:nvPr>
         </p:nvGraphicFramePr>
         <p:xfrm>
-          <a:off x="968512" y="1760261"/>
-          <a:ext cx="5541616" cy="1981200"/>
+          <a:off x="382104" y="1780139"/>
+          <a:ext cx="11693939" cy="1854200"/>
         </p:xfrm>
         <a:graphic>
           <a:graphicData uri="http://schemas.openxmlformats.org/drawingml/2006/table">
@@ -3729,14 +3752,14 @@
                 <a:tableStyleId>{5C22544A-7EE6-4342-B048-85BDC9FD1C3A}</a:tableStyleId>
               </a:tblPr>
               <a:tblGrid>
-                <a:gridCol w="2770808">
+                <a:gridCol w="2592141">
                   <a:extLst>
                     <a:ext uri="{9D8B030D-6E8A-4147-A177-3AD203B41FA5}">
                       <a16:colId xmlns:a16="http://schemas.microsoft.com/office/drawing/2014/main" val="883490984"/>
                     </a:ext>
                   </a:extLst>
                 </a:gridCol>
-                <a:gridCol w="2770808">
+                <a:gridCol w="9101798">
                   <a:extLst>
                     <a:ext uri="{9D8B030D-6E8A-4147-A177-3AD203B41FA5}">
                       <a16:colId xmlns:a16="http://schemas.microsoft.com/office/drawing/2014/main" val="2203427779"/>
@@ -3751,7 +3774,7 @@
                     <a:lstStyle/>
                     <a:p>
                       <a:r>
-                        <a:rPr lang="en-US" sz="2000" dirty="0"/>
+                        <a:rPr lang="en-US" sz="1800" dirty="0"/>
                         <a:t>Method of set up</a:t>
                       </a:r>
                     </a:p>
@@ -3764,10 +3787,9 @@
                     <a:lstStyle/>
                     <a:p>
                       <a:r>
-                        <a:rPr lang="en-US" sz="2000"/>
+                        <a:rPr lang="en-US" sz="1800" dirty="0"/>
                         <a:t>Setup Guidance</a:t>
                       </a:r>
-                      <a:endParaRPr lang="en-US" sz="2000" dirty="0"/>
                     </a:p>
                   </a:txBody>
                   <a:tcPr/>
@@ -3785,7 +3807,7 @@
                     <a:lstStyle/>
                     <a:p>
                       <a:r>
-                        <a:rPr lang="en-US" sz="2000" dirty="0"/>
+                        <a:rPr lang="en-US" sz="1800" dirty="0"/>
                         <a:t>Via Azure Portal</a:t>
                       </a:r>
                     </a:p>
@@ -3797,7 +3819,7 @@
                     <a:bodyPr/>
                     <a:lstStyle/>
                     <a:p>
-                      <a:endParaRPr lang="en-US" sz="2000" dirty="0"/>
+                      <a:endParaRPr lang="en-US" sz="1800" dirty="0"/>
                     </a:p>
                   </a:txBody>
                   <a:tcPr/>
@@ -3815,7 +3837,7 @@
                     <a:lstStyle/>
                     <a:p>
                       <a:r>
-                        <a:rPr lang="en-US" sz="2000" dirty="0"/>
+                        <a:rPr lang="en-US" sz="1800" dirty="0"/>
                         <a:t>Using Azure CLI</a:t>
                       </a:r>
                     </a:p>
@@ -3827,7 +3849,31 @@
                     <a:bodyPr/>
                     <a:lstStyle/>
                     <a:p>
-                      <a:endParaRPr lang="en-US" sz="2000" dirty="0"/>
+                      <a:r>
+                        <a:rPr lang="en-US" sz="1800" dirty="0">
+                          <a:hlinkClick r:id="rId2"/>
+                        </a:rPr>
+                        <a:t>AKSWorkshop/src/01Setup/AKS-Quick-Deploy-CLI.md at main · </a:t>
+                      </a:r>
+                      <a:r>
+                        <a:rPr lang="en-US" sz="1800" dirty="0" err="1">
+                          <a:hlinkClick r:id="rId2"/>
+                        </a:rPr>
+                        <a:t>fhbilgen</a:t>
+                      </a:r>
+                      <a:r>
+                        <a:rPr lang="en-US" sz="1800" dirty="0">
+                          <a:hlinkClick r:id="rId2"/>
+                        </a:rPr>
+                        <a:t>/</a:t>
+                      </a:r>
+                      <a:r>
+                        <a:rPr lang="en-US" sz="1800" dirty="0" err="1">
+                          <a:hlinkClick r:id="rId2"/>
+                        </a:rPr>
+                        <a:t>AKSWorkshop</a:t>
+                      </a:r>
+                      <a:endParaRPr lang="en-US" sz="1800" dirty="0"/>
                     </a:p>
                   </a:txBody>
                   <a:tcPr/>
@@ -3845,7 +3891,7 @@
                     <a:lstStyle/>
                     <a:p>
                       <a:r>
-                        <a:rPr lang="en-US" sz="2000" dirty="0"/>
+                        <a:rPr lang="en-US" sz="1800" dirty="0"/>
                         <a:t>Using Bicep</a:t>
                       </a:r>
                     </a:p>
@@ -3857,7 +3903,31 @@
                     <a:bodyPr/>
                     <a:lstStyle/>
                     <a:p>
-                      <a:endParaRPr lang="en-US" sz="2000" dirty="0"/>
+                      <a:r>
+                        <a:rPr lang="en-US" dirty="0">
+                          <a:hlinkClick r:id="rId3"/>
+                        </a:rPr>
+                        <a:t>AKSWorkshop/src/01Setup/AKS-Quick-Deploy-Bicep.md at main · </a:t>
+                      </a:r>
+                      <a:r>
+                        <a:rPr lang="en-US" dirty="0" err="1">
+                          <a:hlinkClick r:id="rId3"/>
+                        </a:rPr>
+                        <a:t>fhbilgen</a:t>
+                      </a:r>
+                      <a:r>
+                        <a:rPr lang="en-US" dirty="0">
+                          <a:hlinkClick r:id="rId3"/>
+                        </a:rPr>
+                        <a:t>/</a:t>
+                      </a:r>
+                      <a:r>
+                        <a:rPr lang="en-US" dirty="0" err="1">
+                          <a:hlinkClick r:id="rId3"/>
+                        </a:rPr>
+                        <a:t>AKSWorkshop</a:t>
+                      </a:r>
+                      <a:endParaRPr lang="en-US" sz="1800" dirty="0"/>
                     </a:p>
                   </a:txBody>
                   <a:tcPr/>
@@ -3875,7 +3945,7 @@
                     <a:lstStyle/>
                     <a:p>
                       <a:r>
-                        <a:rPr lang="en-US" sz="2000" dirty="0"/>
+                        <a:rPr lang="en-US" sz="1800" dirty="0"/>
                         <a:t>Using Terraform</a:t>
                       </a:r>
                     </a:p>
@@ -3887,7 +3957,7 @@
                     <a:bodyPr/>
                     <a:lstStyle/>
                     <a:p>
-                      <a:endParaRPr lang="en-US" sz="2000" dirty="0"/>
+                      <a:endParaRPr lang="en-US" sz="1800" dirty="0"/>
                     </a:p>
                   </a:txBody>
                   <a:tcPr/>

</xml_diff>